<commit_message>
minor update to presentation 2
</commit_message>
<xml_diff>
--- a/presentations/2 - About R and RStudio.pptx
+++ b/presentations/2 - About R and RStudio.pptx
@@ -218,7 +218,7 @@
           <a:p>
             <a:fld id="{22668931-3B21-49FF-8F8C-71636D3B6246}" type="datetimeFigureOut">
               <a:rPr lang="en-US" smtClean="0"/>
-              <a:t>10/26/2023</a:t>
+              <a:t>11/10/2023</a:t>
             </a:fld>
             <a:endParaRPr lang="en-US"/>
           </a:p>
@@ -1698,7 +1698,7 @@
           <a:p>
             <a:fld id="{375DD456-C247-4442-A401-25876125ED1F}" type="datetimeFigureOut">
               <a:rPr lang="en-US" smtClean="0"/>
-              <a:t>10/26/2023</a:t>
+              <a:t>11/10/2023</a:t>
             </a:fld>
             <a:endParaRPr lang="en-US"/>
           </a:p>
@@ -1896,7 +1896,7 @@
           <a:p>
             <a:fld id="{375DD456-C247-4442-A401-25876125ED1F}" type="datetimeFigureOut">
               <a:rPr lang="en-US" smtClean="0"/>
-              <a:t>10/26/2023</a:t>
+              <a:t>11/10/2023</a:t>
             </a:fld>
             <a:endParaRPr lang="en-US"/>
           </a:p>
@@ -2104,7 +2104,7 @@
           <a:p>
             <a:fld id="{375DD456-C247-4442-A401-25876125ED1F}" type="datetimeFigureOut">
               <a:rPr lang="en-US" smtClean="0"/>
-              <a:t>10/26/2023</a:t>
+              <a:t>11/10/2023</a:t>
             </a:fld>
             <a:endParaRPr lang="en-US"/>
           </a:p>
@@ -2302,7 +2302,7 @@
           <a:p>
             <a:fld id="{375DD456-C247-4442-A401-25876125ED1F}" type="datetimeFigureOut">
               <a:rPr lang="en-US" smtClean="0"/>
-              <a:t>10/26/2023</a:t>
+              <a:t>11/10/2023</a:t>
             </a:fld>
             <a:endParaRPr lang="en-US"/>
           </a:p>
@@ -2577,7 +2577,7 @@
           <a:p>
             <a:fld id="{375DD456-C247-4442-A401-25876125ED1F}" type="datetimeFigureOut">
               <a:rPr lang="en-US" smtClean="0"/>
-              <a:t>10/26/2023</a:t>
+              <a:t>11/10/2023</a:t>
             </a:fld>
             <a:endParaRPr lang="en-US"/>
           </a:p>
@@ -2842,7 +2842,7 @@
           <a:p>
             <a:fld id="{375DD456-C247-4442-A401-25876125ED1F}" type="datetimeFigureOut">
               <a:rPr lang="en-US" smtClean="0"/>
-              <a:t>10/26/2023</a:t>
+              <a:t>11/10/2023</a:t>
             </a:fld>
             <a:endParaRPr lang="en-US"/>
           </a:p>
@@ -3254,7 +3254,7 @@
           <a:p>
             <a:fld id="{375DD456-C247-4442-A401-25876125ED1F}" type="datetimeFigureOut">
               <a:rPr lang="en-US" smtClean="0"/>
-              <a:t>10/26/2023</a:t>
+              <a:t>11/10/2023</a:t>
             </a:fld>
             <a:endParaRPr lang="en-US"/>
           </a:p>
@@ -3395,7 +3395,7 @@
           <a:p>
             <a:fld id="{375DD456-C247-4442-A401-25876125ED1F}" type="datetimeFigureOut">
               <a:rPr lang="en-US" smtClean="0"/>
-              <a:t>10/26/2023</a:t>
+              <a:t>11/10/2023</a:t>
             </a:fld>
             <a:endParaRPr lang="en-US"/>
           </a:p>
@@ -3508,7 +3508,7 @@
           <a:p>
             <a:fld id="{375DD456-C247-4442-A401-25876125ED1F}" type="datetimeFigureOut">
               <a:rPr lang="en-US" smtClean="0"/>
-              <a:t>10/26/2023</a:t>
+              <a:t>11/10/2023</a:t>
             </a:fld>
             <a:endParaRPr lang="en-US"/>
           </a:p>
@@ -3819,7 +3819,7 @@
           <a:p>
             <a:fld id="{375DD456-C247-4442-A401-25876125ED1F}" type="datetimeFigureOut">
               <a:rPr lang="en-US" smtClean="0"/>
-              <a:t>10/26/2023</a:t>
+              <a:t>11/10/2023</a:t>
             </a:fld>
             <a:endParaRPr lang="en-US"/>
           </a:p>
@@ -4107,7 +4107,7 @@
           <a:p>
             <a:fld id="{375DD456-C247-4442-A401-25876125ED1F}" type="datetimeFigureOut">
               <a:rPr lang="en-US" smtClean="0"/>
-              <a:t>10/26/2023</a:t>
+              <a:t>11/10/2023</a:t>
             </a:fld>
             <a:endParaRPr lang="en-US"/>
           </a:p>
@@ -4348,7 +4348,7 @@
           <a:p>
             <a:fld id="{375DD456-C247-4442-A401-25876125ED1F}" type="datetimeFigureOut">
               <a:rPr lang="en-US" smtClean="0"/>
-              <a:t>10/26/2023</a:t>
+              <a:t>11/10/2023</a:t>
             </a:fld>
             <a:endParaRPr lang="en-US"/>
           </a:p>
@@ -4868,7 +4868,7 @@
           <a:p>
             <a:r>
               <a:rPr lang="en-US" dirty="0"/>
-              <a:t>Quiz 1-1 ANSWERS</a:t>
+              <a:t>Quiz 2-1 ANSWERS</a:t>
             </a:r>
           </a:p>
         </p:txBody>
@@ -6356,7 +6356,7 @@
               <a:rPr lang="en-US" sz="2400" dirty="0">
                 <a:latin typeface="Consolas" panose="020B0609020204030204" pitchFamily="49" charset="0"/>
               </a:rPr>
-              <a:t>dataframename$col1</a:t>
+              <a:t>dataframename$column1</a:t>
             </a:r>
             <a:endParaRPr lang="en-US" dirty="0">
               <a:latin typeface="Consolas" panose="020B0609020204030204" pitchFamily="49" charset="0"/>
@@ -6577,14 +6577,6 @@
             <a:r>
               <a:rPr lang="en-US" dirty="0" err="1"/>
               <a:t>Ctrl+Enter</a:t>
-            </a:r>
-            <a:r>
-              <a:rPr lang="en-US" dirty="0"/>
-              <a:t>/</a:t>
-            </a:r>
-            <a:r>
-              <a:rPr lang="en-US" dirty="0" err="1"/>
-              <a:t>Cmd+Return</a:t>
             </a:r>
             <a:r>
               <a:rPr lang="en-US" dirty="0"/>
@@ -7183,7 +7175,7 @@
             </a:pPr>
             <a:r>
               <a:rPr lang="en-US" b="1" u="sng" dirty="0"/>
-              <a:t>What we just learned</a:t>
+              <a:t>What we have learned</a:t>
             </a:r>
           </a:p>
           <a:p>
@@ -8193,7 +8185,7 @@
           <a:p>
             <a:r>
               <a:rPr lang="en-US" dirty="0"/>
-              <a:t>Quiz 1-2</a:t>
+              <a:t>Quiz 2-2</a:t>
             </a:r>
           </a:p>
         </p:txBody>
@@ -8610,7 +8602,7 @@
             </a:pPr>
             <a:r>
               <a:rPr lang="en-US" dirty="0"/>
-              <a:t>b)  Ctrl + Enter (CMD + Return)</a:t>
+              <a:t>b)  Ctrl + Enter </a:t>
             </a:r>
           </a:p>
           <a:p>
@@ -8781,7 +8773,7 @@
           <a:p>
             <a:r>
               <a:rPr lang="en-US" dirty="0"/>
-              <a:t>Think of R as notepad and RStudio as MS Word. </a:t>
+              <a:t>Think of R as notepad and RStudio as MS Word </a:t>
             </a:r>
           </a:p>
           <a:p>
@@ -8850,76 +8842,97 @@
           </a:p>
         </p:txBody>
       </p:sp>
-      <p:pic>
-        <p:nvPicPr>
-          <p:cNvPr id="5" name="Picture 4" descr="A close up of a sign&#10;&#10;Description automatically generated">
-            <a:extLst>
-              <a:ext uri="{FF2B5EF4-FFF2-40B4-BE49-F238E27FC236}">
-                <a16:creationId xmlns:a16="http://schemas.microsoft.com/office/drawing/2014/main" id="{98EA43B1-CD32-4585-A5CE-BD55AE67BC35}"/>
-              </a:ext>
-            </a:extLst>
-          </p:cNvPr>
-          <p:cNvPicPr>
-            <a:picLocks noChangeAspect="1"/>
-          </p:cNvPicPr>
+      <p:grpSp>
+        <p:nvGrpSpPr>
+          <p:cNvPr id="11" name="Group 10">
+            <a:extLst>
+              <a:ext uri="{FF2B5EF4-FFF2-40B4-BE49-F238E27FC236}">
+                <a16:creationId xmlns:a16="http://schemas.microsoft.com/office/drawing/2014/main" id="{93033E89-A90F-EB7A-C030-1DD4DA42328F}"/>
+              </a:ext>
+            </a:extLst>
+          </p:cNvPr>
+          <p:cNvGrpSpPr/>
           <p:nvPr/>
-        </p:nvPicPr>
-        <p:blipFill rotWithShape="1">
-          <a:blip r:embed="rId3">
-            <a:extLst>
-              <a:ext uri="{28A0092B-C50C-407E-A947-70E740481C1C}">
-                <a14:useLocalDpi xmlns:a14="http://schemas.microsoft.com/office/drawing/2010/main" val="0"/>
-              </a:ext>
-            </a:extLst>
-          </a:blip>
-          <a:srcRect r="62987"/>
-          <a:stretch/>
-        </p:blipFill>
-        <p:spPr>
+        </p:nvGrpSpPr>
+        <p:grpSpPr>
           <a:xfrm>
-            <a:off x="9351635" y="2479218"/>
-            <a:ext cx="2002164" cy="1899564"/>
+            <a:off x="8610600" y="2090313"/>
+            <a:ext cx="3407229" cy="3071947"/>
+            <a:chOff x="8784771" y="2124105"/>
+            <a:chExt cx="3407229" cy="3071947"/>
           </a:xfrm>
-          <a:prstGeom prst="rect">
-            <a:avLst/>
-          </a:prstGeom>
-        </p:spPr>
-      </p:pic>
-      <p:pic>
-        <p:nvPicPr>
-          <p:cNvPr id="6" name="Picture 5" descr="A close up of a sign&#10;&#10;Description automatically generated">
-            <a:extLst>
-              <a:ext uri="{FF2B5EF4-FFF2-40B4-BE49-F238E27FC236}">
-                <a16:creationId xmlns:a16="http://schemas.microsoft.com/office/drawing/2014/main" id="{C0B31357-9FD6-4D54-9590-85EE4D3DBE21}"/>
-              </a:ext>
-            </a:extLst>
-          </p:cNvPr>
-          <p:cNvPicPr>
-            <a:picLocks noChangeAspect="1"/>
-          </p:cNvPicPr>
-          <p:nvPr/>
-        </p:nvPicPr>
-        <p:blipFill rotWithShape="1">
-          <a:blip r:embed="rId3">
-            <a:extLst>
-              <a:ext uri="{28A0092B-C50C-407E-A947-70E740481C1C}">
-                <a14:useLocalDpi xmlns:a14="http://schemas.microsoft.com/office/drawing/2010/main" val="0"/>
-              </a:ext>
-            </a:extLst>
-          </a:blip>
-          <a:srcRect l="37013"/>
-          <a:stretch/>
-        </p:blipFill>
-        <p:spPr>
-          <a:xfrm>
-            <a:off x="8610600" y="3861705"/>
-            <a:ext cx="3407229" cy="1899564"/>
-          </a:xfrm>
-          <a:prstGeom prst="rect">
-            <a:avLst/>
-          </a:prstGeom>
-        </p:spPr>
-      </p:pic>
+        </p:grpSpPr>
+        <p:pic>
+          <p:nvPicPr>
+            <p:cNvPr id="5" name="Picture 4" descr="A close up of a sign&#10;&#10;Description automatically generated">
+              <a:extLst>
+                <a:ext uri="{FF2B5EF4-FFF2-40B4-BE49-F238E27FC236}">
+                  <a16:creationId xmlns:a16="http://schemas.microsoft.com/office/drawing/2014/main" id="{98EA43B1-CD32-4585-A5CE-BD55AE67BC35}"/>
+                </a:ext>
+              </a:extLst>
+            </p:cNvPr>
+            <p:cNvPicPr>
+              <a:picLocks noChangeAspect="1"/>
+            </p:cNvPicPr>
+            <p:nvPr/>
+          </p:nvPicPr>
+          <p:blipFill rotWithShape="1">
+            <a:blip r:embed="rId3">
+              <a:extLst>
+                <a:ext uri="{28A0092B-C50C-407E-A947-70E740481C1C}">
+                  <a14:useLocalDpi xmlns:a14="http://schemas.microsoft.com/office/drawing/2010/main" val="0"/>
+                </a:ext>
+              </a:extLst>
+            </a:blip>
+            <a:srcRect r="62987"/>
+            <a:stretch/>
+          </p:blipFill>
+          <p:spPr>
+            <a:xfrm>
+              <a:off x="9351636" y="2124105"/>
+              <a:ext cx="2002164" cy="1899564"/>
+            </a:xfrm>
+            <a:prstGeom prst="rect">
+              <a:avLst/>
+            </a:prstGeom>
+          </p:spPr>
+        </p:pic>
+        <p:pic>
+          <p:nvPicPr>
+            <p:cNvPr id="6" name="Picture 5" descr="A close up of a sign&#10;&#10;Description automatically generated">
+              <a:extLst>
+                <a:ext uri="{FF2B5EF4-FFF2-40B4-BE49-F238E27FC236}">
+                  <a16:creationId xmlns:a16="http://schemas.microsoft.com/office/drawing/2014/main" id="{C0B31357-9FD6-4D54-9590-85EE4D3DBE21}"/>
+                </a:ext>
+              </a:extLst>
+            </p:cNvPr>
+            <p:cNvPicPr>
+              <a:picLocks noChangeAspect="1"/>
+            </p:cNvPicPr>
+            <p:nvPr/>
+          </p:nvPicPr>
+          <p:blipFill rotWithShape="1">
+            <a:blip r:embed="rId3">
+              <a:extLst>
+                <a:ext uri="{28A0092B-C50C-407E-A947-70E740481C1C}">
+                  <a14:useLocalDpi xmlns:a14="http://schemas.microsoft.com/office/drawing/2010/main" val="0"/>
+                </a:ext>
+              </a:extLst>
+            </a:blip>
+            <a:srcRect l="37013"/>
+            <a:stretch/>
+          </p:blipFill>
+          <p:spPr>
+            <a:xfrm>
+              <a:off x="8784771" y="3296488"/>
+              <a:ext cx="3407229" cy="1899564"/>
+            </a:xfrm>
+            <a:prstGeom prst="rect">
+              <a:avLst/>
+            </a:prstGeom>
+          </p:spPr>
+        </p:pic>
+      </p:grpSp>
       <p:cxnSp>
         <p:nvCxnSpPr>
           <p:cNvPr id="8" name="Straight Connector 7">
@@ -8982,8 +8995,8 @@
         </p:nvGrpSpPr>
         <p:grpSpPr>
           <a:xfrm>
-            <a:off x="7077076" y="4378781"/>
-            <a:ext cx="4940754" cy="1553023"/>
+            <a:off x="6599725" y="4946543"/>
+            <a:ext cx="5135075" cy="1338102"/>
             <a:chOff x="7077076" y="4378781"/>
             <a:chExt cx="4940754" cy="1553023"/>
           </a:xfrm>
@@ -9145,87 +9158,15 @@
                                   </p:childTnLst>
                                 </p:cTn>
                               </p:par>
-                            </p:childTnLst>
-                          </p:cTn>
-                        </p:par>
-                      </p:childTnLst>
-                    </p:cTn>
-                  </p:par>
-                  <p:par>
-                    <p:cTn id="7" fill="hold">
-                      <p:stCondLst>
-                        <p:cond delay="indefinite"/>
-                      </p:stCondLst>
-                      <p:childTnLst>
-                        <p:par>
-                          <p:cTn id="8" fill="hold">
-                            <p:stCondLst>
-                              <p:cond delay="0"/>
-                            </p:stCondLst>
-                            <p:childTnLst>
                               <p:par>
-                                <p:cTn id="9" presetID="1" presetClass="exit" presetSubtype="0" fill="hold" nodeType="clickEffect">
+                                <p:cTn id="7" presetID="1" presetClass="entr" presetSubtype="0" fill="hold" nodeType="withEffect">
                                   <p:stCondLst>
                                     <p:cond delay="0"/>
                                   </p:stCondLst>
                                   <p:childTnLst>
                                     <p:set>
                                       <p:cBhvr>
-                                        <p:cTn id="10" dur="1" fill="hold">
-                                          <p:stCondLst>
-                                            <p:cond delay="0"/>
-                                          </p:stCondLst>
-                                        </p:cTn>
-                                        <p:tgtEl>
-                                          <p:spTgt spid="6"/>
-                                        </p:tgtEl>
-                                        <p:attrNameLst>
-                                          <p:attrName>style.visibility</p:attrName>
-                                        </p:attrNameLst>
-                                      </p:cBhvr>
-                                      <p:to>
-                                        <p:strVal val="hidden"/>
-                                      </p:to>
-                                    </p:set>
-                                  </p:childTnLst>
-                                </p:cTn>
-                              </p:par>
-                              <p:par>
-                                <p:cTn id="11" presetID="1" presetClass="exit" presetSubtype="0" fill="hold" nodeType="withEffect">
-                                  <p:stCondLst>
-                                    <p:cond delay="0"/>
-                                  </p:stCondLst>
-                                  <p:childTnLst>
-                                    <p:set>
-                                      <p:cBhvr>
-                                        <p:cTn id="12" dur="1" fill="hold">
-                                          <p:stCondLst>
-                                            <p:cond delay="0"/>
-                                          </p:stCondLst>
-                                        </p:cTn>
-                                        <p:tgtEl>
-                                          <p:spTgt spid="5"/>
-                                        </p:tgtEl>
-                                        <p:attrNameLst>
-                                          <p:attrName>style.visibility</p:attrName>
-                                        </p:attrNameLst>
-                                      </p:cBhvr>
-                                      <p:to>
-                                        <p:strVal val="hidden"/>
-                                      </p:to>
-                                    </p:set>
-                                  </p:childTnLst>
-                                </p:cTn>
-                              </p:par>
-                              <p:par>
-                                <p:cTn id="13" presetID="1" presetClass="entr" presetSubtype="0" fill="hold" nodeType="withEffect">
-                                  <p:stCondLst>
-                                    <p:cond delay="0"/>
-                                  </p:stCondLst>
-                                  <p:childTnLst>
-                                    <p:set>
-                                      <p:cBhvr>
-                                        <p:cTn id="14" dur="1" fill="hold">
+                                        <p:cTn id="8" dur="1" fill="hold">
                                           <p:stCondLst>
                                             <p:cond delay="0"/>
                                           </p:stCondLst>
@@ -9315,7 +9256,7 @@
           <a:p>
             <a:r>
               <a:rPr lang="en-US" dirty="0"/>
-              <a:t>Quiz 1-2 ANSWERS</a:t>
+              <a:t>Quiz 2-2 ANSWERS</a:t>
             </a:r>
           </a:p>
         </p:txBody>
@@ -9732,7 +9673,7 @@
             </a:pPr>
             <a:r>
               <a:rPr lang="en-US" dirty="0"/>
-              <a:t>b)  Ctrl + Enter (CMD + Return)</a:t>
+              <a:t>b)  Ctrl + Enter </a:t>
             </a:r>
           </a:p>
           <a:p>
@@ -9860,7 +9801,7 @@
         </p:blipFill>
         <p:spPr>
           <a:xfrm>
-            <a:off x="10620374" y="3100939"/>
+            <a:off x="8610600" y="3182546"/>
             <a:ext cx="914400" cy="914400"/>
           </a:xfrm>
           <a:prstGeom prst="rect">
@@ -10433,7 +10374,7 @@
           <a:p>
             <a:r>
               <a:rPr lang="en-US" dirty="0"/>
-              <a:t>Quiz 1-3</a:t>
+              <a:t>Quiz 2-3</a:t>
             </a:r>
           </a:p>
         </p:txBody>
@@ -11324,7 +11265,7 @@
           <a:p>
             <a:r>
               <a:rPr lang="en-US" dirty="0"/>
-              <a:t>Quiz 1-3 ANSWERS</a:t>
+              <a:t>Quiz 2-3 ANSWERS</a:t>
             </a:r>
           </a:p>
         </p:txBody>
@@ -12344,7 +12285,7 @@
         <p:spPr>
           <a:xfrm>
             <a:off x="6676103" y="5624052"/>
-            <a:ext cx="5014452" cy="584775"/>
+            <a:ext cx="5014452" cy="523220"/>
           </a:xfrm>
           <a:prstGeom prst="rect">
             <a:avLst/>
@@ -12358,7 +12299,7 @@
           <a:lstStyle/>
           <a:p>
             <a:r>
-              <a:rPr lang="en-US" sz="1600" dirty="0"/>
+              <a:rPr lang="en-US" sz="1400" dirty="0"/>
               <a:t>gif: https://www.pipinghotdata.com/posts/2020-09-07-introducing-the-rstudio-ide-and-r-markdown/</a:t>
             </a:r>
           </a:p>
@@ -16460,7 +16401,7 @@
             </a:pPr>
             <a:r>
               <a:rPr lang="en-US" dirty="0"/>
-              <a:t>There are different “versions” of R, released to update software</a:t>
+              <a:t>There are different “versions” of R, update the software</a:t>
             </a:r>
           </a:p>
           <a:p>
@@ -16471,7 +16412,7 @@
             </a:pPr>
             <a:r>
               <a:rPr lang="en-US" dirty="0"/>
-              <a:t>Occasionally (~once a year) you may need to update R</a:t>
+              <a:t>Occasionally (~once a year) you may need to update R (or RStudio)</a:t>
             </a:r>
           </a:p>
           <a:p>
@@ -16482,7 +16423,7 @@
             </a:pPr>
             <a:r>
               <a:rPr lang="en-US" dirty="0"/>
-              <a:t>Do this by downloading from CRAN and/or running:</a:t>
+              <a:t>Do this by downloading from Software Center and/or running:</a:t>
             </a:r>
           </a:p>
           <a:p>
@@ -17072,7 +17013,7 @@
           <a:p>
             <a:r>
               <a:rPr lang="en-US" dirty="0"/>
-              <a:t>Quiz 1-1</a:t>
+              <a:t>Quiz 2-1</a:t>
             </a:r>
           </a:p>
         </p:txBody>

</xml_diff>